<commit_message>
releasing L7  and workshop 4
</commit_message>
<xml_diff>
--- a/slides/WSTA_L7_dependency.pptx
+++ b/slides/WSTA_L7_dependency.pptx
@@ -887,6 +887,67 @@
           <a:bodyPr/>
           <a:lstStyle/>
           <a:p>
+            <a:endParaRPr lang="en-US" dirty="0"/>
+          </a:p>
+        </p:txBody>
+      </p:sp>
+    </p:spTree>
+    <p:extLst>
+      <p:ext uri="{BB962C8B-B14F-4D97-AF65-F5344CB8AC3E}">
+        <p14:creationId xmlns:p14="http://schemas.microsoft.com/office/powerpoint/2010/main" val="1349509354"/>
+      </p:ext>
+    </p:extLst>
+  </p:cSld>
+  <p:clrMapOvr>
+    <a:masterClrMapping/>
+  </p:clrMapOvr>
+</p:notes>
+</file>
+
+<file path=ppt/notesSlides/notesSlide6.xml><?xml version="1.0" encoding="utf-8"?>
+<p:notes xmlns:a="http://schemas.openxmlformats.org/drawingml/2006/main" xmlns:r="http://schemas.openxmlformats.org/officeDocument/2006/relationships" xmlns:p="http://schemas.openxmlformats.org/presentationml/2006/main">
+  <p:cSld>
+    <p:spTree>
+      <p:nvGrpSpPr>
+        <p:cNvPr id="1" name=""/>
+        <p:cNvGrpSpPr/>
+        <p:nvPr/>
+      </p:nvGrpSpPr>
+      <p:grpSpPr>
+        <a:xfrm>
+          <a:off x="0" y="0"/>
+          <a:ext cx="0" cy="0"/>
+          <a:chOff x="0" y="0"/>
+          <a:chExt cx="0" cy="0"/>
+        </a:xfrm>
+      </p:grpSpPr>
+      <p:sp>
+        <p:nvSpPr>
+          <p:cNvPr id="2" name="Slide Image Placeholder 1"/>
+          <p:cNvSpPr>
+            <a:spLocks noGrp="1" noRot="1" noChangeAspect="1"/>
+          </p:cNvSpPr>
+          <p:nvPr>
+            <p:ph type="sldImg"/>
+          </p:nvPr>
+        </p:nvSpPr>
+        <p:spPr/>
+      </p:sp>
+      <p:sp>
+        <p:nvSpPr>
+          <p:cNvPr id="3" name="Notes Placeholder 2"/>
+          <p:cNvSpPr>
+            <a:spLocks noGrp="1"/>
+          </p:cNvSpPr>
+          <p:nvPr>
+            <p:ph type="body" idx="1"/>
+          </p:nvPr>
+        </p:nvSpPr>
+        <p:spPr/>
+        <p:txBody>
+          <a:bodyPr/>
+          <a:lstStyle/>
+          <a:p>
             <a:r>
               <a:rPr lang="en-AU" dirty="0" smtClean="0"/>
               <a:t>Danish:</a:t>
@@ -1058,7 +1119,7 @@
 </p:notes>
 </file>
 
-<file path=ppt/notesSlides/notesSlide6.xml><?xml version="1.0" encoding="utf-8"?>
+<file path=ppt/notesSlides/notesSlide7.xml><?xml version="1.0" encoding="utf-8"?>
 <p:notes xmlns:a="http://schemas.openxmlformats.org/drawingml/2006/main" xmlns:r="http://schemas.openxmlformats.org/officeDocument/2006/relationships" xmlns:p="http://schemas.openxmlformats.org/presentationml/2006/main">
   <p:cSld>
     <p:spTree>
@@ -3957,7 +4018,7 @@
           <p:nvPr/>
         </p:nvPicPr>
         <p:blipFill>
-          <a:blip r:embed="rId2"/>
+          <a:blip r:embed="rId3"/>
           <a:stretch>
             <a:fillRect/>
           </a:stretch>
@@ -3972,6 +4033,43 @@
           </a:prstGeom>
         </p:spPr>
       </p:pic>
+      <p:sp>
+        <p:nvSpPr>
+          <p:cNvPr id="5" name="Rectangle 4"/>
+          <p:cNvSpPr/>
+          <p:nvPr/>
+        </p:nvSpPr>
+        <p:spPr>
+          <a:xfrm>
+            <a:off x="10080777" y="8892961"/>
+            <a:ext cx="2351926" cy="400110"/>
+          </a:xfrm>
+          <a:prstGeom prst="rect">
+            <a:avLst/>
+          </a:prstGeom>
+        </p:spPr>
+        <p:txBody>
+          <a:bodyPr wrap="none">
+            <a:spAutoFit/>
+          </a:bodyPr>
+          <a:lstStyle/>
+          <a:p>
+            <a:r>
+              <a:rPr lang="en-AU" dirty="0" smtClean="0"/>
+              <a:t>Figure JM3, </a:t>
+            </a:r>
+            <a:r>
+              <a:rPr lang="en-AU" dirty="0" err="1" smtClean="0"/>
+              <a:t>Ch</a:t>
+            </a:r>
+            <a:r>
+              <a:rPr lang="en-AU" dirty="0" smtClean="0"/>
+              <a:t> 14</a:t>
+            </a:r>
+            <a:endParaRPr lang="en-US" dirty="0"/>
+          </a:p>
+        </p:txBody>
+      </p:sp>
     </p:spTree>
     <p:extLst>
       <p:ext uri="{BB962C8B-B14F-4D97-AF65-F5344CB8AC3E}">
@@ -4769,13 +4867,8 @@
             </a:r>
             <a:r>
               <a:rPr lang="en-AU" dirty="0" smtClean="0"/>
-              <a:t>treats problem as incremental sequence of decisions over next action in a state </a:t>
-            </a:r>
-            <a:r>
-              <a:rPr lang="en-AU" dirty="0" smtClean="0"/>
-              <a:t>machine</a:t>
-            </a:r>
-            <a:endParaRPr lang="en-AU" dirty="0" smtClean="0"/>
+              <a:t>treats problem as incremental sequence of decisions over next action in a state machine</a:t>
+            </a:r>
           </a:p>
         </p:txBody>
       </p:sp>
@@ -4866,13 +4959,8 @@
           <a:p>
             <a:r>
               <a:rPr lang="en-AU" dirty="0" smtClean="0"/>
-              <a:t>Frames parsing as sequence of simple parsing </a:t>
-            </a:r>
-            <a:r>
-              <a:rPr lang="en-AU" dirty="0" smtClean="0"/>
-              <a:t>transitions</a:t>
-            </a:r>
-            <a:endParaRPr lang="en-AU" dirty="0" smtClean="0"/>
+              <a:t>Frames parsing as sequence of simple parsing transitions</a:t>
+            </a:r>
           </a:p>
           <a:p>
             <a:pPr lvl="1"/>
@@ -4912,13 +5000,8 @@
             <a:pPr lvl="1"/>
             <a:r>
               <a:rPr lang="en-AU" dirty="0" smtClean="0"/>
-              <a:t>two types of </a:t>
-            </a:r>
-            <a:r>
-              <a:rPr lang="en-AU" dirty="0" smtClean="0"/>
-              <a:t>transitions</a:t>
-            </a:r>
-            <a:endParaRPr lang="en-AU" dirty="0" smtClean="0"/>
+              <a:t>two types of transitions</a:t>
+            </a:r>
           </a:p>
           <a:p>
             <a:pPr lvl="2"/>
@@ -4954,11 +5037,7 @@
             </a:r>
             <a:r>
               <a:rPr lang="en-AU" dirty="0" smtClean="0"/>
-              <a:t>dependent from stack</a:t>
-            </a:r>
-            <a:r>
-              <a:rPr lang="en-AU" dirty="0" smtClean="0"/>
-              <a:t>)</a:t>
+              <a:t>dependent from stack)</a:t>
             </a:r>
             <a:endParaRPr lang="en-AU" i="1" dirty="0" smtClean="0"/>
           </a:p>
@@ -5021,11 +5100,7 @@
           <a:p>
             <a:r>
               <a:rPr lang="en-AU" dirty="0" smtClean="0"/>
-              <a:t>transition based </a:t>
-            </a:r>
-            <a:r>
-              <a:rPr lang="en-AU" dirty="0" smtClean="0"/>
-              <a:t>parsing algorithm</a:t>
+              <a:t>transition based parsing algorithm</a:t>
             </a:r>
             <a:endParaRPr lang="en-AU" dirty="0"/>
           </a:p>
@@ -5055,11 +5130,7 @@
           <a:p>
             <a:r>
               <a:rPr lang="en-AU" dirty="0" smtClean="0"/>
-              <a:t>For </a:t>
-            </a:r>
-            <a:r>
-              <a:rPr lang="en-AU" dirty="0" smtClean="0"/>
-              <a:t>each word in input (buffer)</a:t>
+              <a:t>For each word in input (buffer)</a:t>
             </a:r>
           </a:p>
           <a:p>
@@ -5078,22 +5149,14 @@
             </a:r>
             <a:r>
               <a:rPr lang="en-AU" dirty="0" smtClean="0"/>
-              <a:t>onto </a:t>
-            </a:r>
-            <a:r>
-              <a:rPr lang="en-AU" dirty="0" smtClean="0"/>
-              <a:t>stack</a:t>
+              <a:t>onto stack</a:t>
             </a:r>
           </a:p>
           <a:p>
             <a:pPr lvl="1"/>
             <a:r>
               <a:rPr lang="en-AU" dirty="0" smtClean="0"/>
-              <a:t>while there are 2 or more </a:t>
-            </a:r>
-            <a:r>
-              <a:rPr lang="en-AU" dirty="0" smtClean="0"/>
-              <a:t>items on stack:</a:t>
+              <a:t>while there are 2 or more items on stack:</a:t>
             </a:r>
           </a:p>
           <a:p>
@@ -5124,20 +5187,11 @@
               <a:rPr lang="en-AU" dirty="0" smtClean="0"/>
               <a:t>b) continue to outer loop</a:t>
             </a:r>
-            <a:endParaRPr lang="en-AU" dirty="0" smtClean="0"/>
-          </a:p>
-          <a:p>
-            <a:r>
-              <a:rPr lang="en-AU" dirty="0" smtClean="0"/>
-              <a:t>Finished when buffer empty &amp; stack </a:t>
-            </a:r>
-            <a:r>
-              <a:rPr lang="en-AU" dirty="0" smtClean="0"/>
-              <a:t>has only </a:t>
-            </a:r>
-            <a:r>
-              <a:rPr lang="en-AU" dirty="0" smtClean="0"/>
-              <a:t>1 item</a:t>
+          </a:p>
+          <a:p>
+            <a:r>
+              <a:rPr lang="en-AU" dirty="0" smtClean="0"/>
+              <a:t>Finished when buffer empty &amp; stack has only 1 item</a:t>
             </a:r>
           </a:p>
           <a:p>
@@ -5147,11 +5201,7 @@
             </a:r>
             <a:r>
               <a:rPr lang="en-AU" i="1" dirty="0" smtClean="0"/>
-              <a:t>projective </a:t>
-            </a:r>
-            <a:r>
-              <a:rPr lang="en-AU" i="1" dirty="0" smtClean="0"/>
-              <a:t>tree</a:t>
+              <a:t>projective tree</a:t>
             </a:r>
             <a:endParaRPr lang="en-AU" i="1" dirty="0"/>
           </a:p>
@@ -9044,7 +9094,7 @@
         </p:nvGraphicFramePr>
         <p:xfrm>
           <a:off x="1461840" y="2284513"/>
-          <a:ext cx="9073008" cy="5046344"/>
+          <a:ext cx="9073008" cy="4832984"/>
         </p:xfrm>
         <a:graphic>
           <a:graphicData uri="http://schemas.openxmlformats.org/drawingml/2006/table">
@@ -11211,25 +11261,7 @@
             <a:br>
               <a:rPr lang="en-AU" i="1" dirty="0" smtClean="0"/>
             </a:br>
-            <a:r>
-              <a:rPr lang="en-AU" i="1" dirty="0" smtClean="0"/>
-              <a:t>(see Goldberg &amp;</a:t>
-            </a:r>
-            <a:br>
-              <a:rPr lang="en-AU" i="1" dirty="0" smtClean="0"/>
-            </a:br>
-            <a:r>
-              <a:rPr lang="en-AU" i="1" dirty="0" smtClean="0"/>
-              <a:t> </a:t>
-            </a:r>
-            <a:r>
-              <a:rPr lang="en-AU" i="1" dirty="0" err="1" smtClean="0"/>
-              <a:t>Nivre</a:t>
-            </a:r>
-            <a:r>
-              <a:rPr lang="en-AU" i="1" dirty="0" smtClean="0"/>
-              <a:t>, 2012)</a:t>
-            </a:r>
+            <a:endParaRPr lang="en-AU" i="1" dirty="0" smtClean="0"/>
           </a:p>
           <a:p>
             <a:endParaRPr lang="en-AU" i="1" dirty="0" smtClean="0"/>
@@ -11260,6 +11292,47 @@
           </a:prstGeom>
         </p:spPr>
       </p:pic>
+      <p:sp>
+        <p:nvSpPr>
+          <p:cNvPr id="5" name="Rectangle 4"/>
+          <p:cNvSpPr/>
+          <p:nvPr/>
+        </p:nvSpPr>
+        <p:spPr>
+          <a:xfrm>
+            <a:off x="7654528" y="9144642"/>
+            <a:ext cx="6502400" cy="400110"/>
+          </a:xfrm>
+          <a:prstGeom prst="rect">
+            <a:avLst/>
+          </a:prstGeom>
+        </p:spPr>
+        <p:txBody>
+          <a:bodyPr>
+            <a:spAutoFit/>
+          </a:bodyPr>
+          <a:lstStyle/>
+          <a:p>
+            <a:r>
+              <a:rPr lang="en-AU" i="1" dirty="0" smtClean="0"/>
+              <a:t>from Goldberg &amp; </a:t>
+            </a:r>
+            <a:r>
+              <a:rPr lang="en-AU" i="1" dirty="0" err="1" smtClean="0"/>
+              <a:t>Nivre</a:t>
+            </a:r>
+            <a:r>
+              <a:rPr lang="en-AU" i="1" dirty="0" smtClean="0"/>
+              <a:t> (2012</a:t>
+            </a:r>
+            <a:r>
+              <a:rPr lang="en-AU" i="1" dirty="0"/>
+              <a:t>)</a:t>
+            </a:r>
+            <a:endParaRPr lang="en-US" dirty="0"/>
+          </a:p>
+        </p:txBody>
+      </p:sp>
     </p:spTree>
     <p:extLst>
       <p:ext uri="{BB962C8B-B14F-4D97-AF65-F5344CB8AC3E}">
@@ -11380,7 +11453,28 @@
             </a:r>
           </a:p>
           <a:p>
+            <a:r>
+              <a:rPr lang="en-US" dirty="0" smtClean="0"/>
+              <a:t>Graph-based parsing (not covered)</a:t>
+            </a:r>
+          </a:p>
+          <a:p>
             <a:pPr lvl="1"/>
+            <a:r>
+              <a:rPr lang="en-US" dirty="0" smtClean="0"/>
+              <a:t>uses classic dynamic </a:t>
+            </a:r>
+            <a:r>
+              <a:rPr lang="en-US" smtClean="0"/>
+              <a:t>programming methods</a:t>
+            </a:r>
+            <a:br>
+              <a:rPr lang="en-US" smtClean="0"/>
+            </a:br>
+            <a:r>
+              <a:rPr lang="en-US" smtClean="0"/>
+              <a:t>(similar to CYK)</a:t>
+            </a:r>
             <a:endParaRPr lang="en-US" dirty="0" smtClean="0"/>
           </a:p>
         </p:txBody>
@@ -11465,11 +11559,7 @@
           <a:p>
             <a:r>
               <a:rPr lang="en-AU" dirty="0" smtClean="0"/>
-              <a:t>J&amp;M3 Ch. </a:t>
-            </a:r>
-            <a:r>
-              <a:rPr lang="en-AU" dirty="0" smtClean="0"/>
-              <a:t>14</a:t>
+              <a:t>J&amp;M3 Ch. 14</a:t>
             </a:r>
           </a:p>
           <a:p>
@@ -11870,7 +11960,6 @@
               <a:rPr lang="en-AU" dirty="0" smtClean="0"/>
               <a:t> </a:t>
             </a:r>
-            <a:endParaRPr lang="en-AU" dirty="0" smtClean="0"/>
           </a:p>
           <a:p>
             <a:endParaRPr lang="en-AU" i="1" dirty="0"/>
@@ -11949,19 +12038,7 @@
             </a:r>
             <a:r>
               <a:rPr lang="en-AU" dirty="0" smtClean="0"/>
-              <a:t>of relation, </a:t>
-            </a:r>
-            <a:r>
-              <a:rPr lang="en-AU" dirty="0" smtClean="0"/>
-              <a:t>lexical form </a:t>
-            </a:r>
-            <a:r>
-              <a:rPr lang="en-AU" dirty="0" smtClean="0"/>
-              <a:t>of </a:t>
-            </a:r>
-            <a:r>
-              <a:rPr lang="en-AU" dirty="0" smtClean="0"/>
-              <a:t>dependent </a:t>
+              <a:t>of relation, lexical form of dependent </a:t>
             </a:r>
             <a:r>
               <a:rPr lang="en-AU" dirty="0" err="1" smtClean="0"/>
@@ -11994,7 +12071,6 @@
               <a:rPr lang="en-AU" dirty="0" smtClean="0"/>
               <a:t>agreement often for gender, number and case</a:t>
             </a:r>
-            <a:endParaRPr lang="en-AU" dirty="0" smtClean="0"/>
           </a:p>
         </p:txBody>
       </p:sp>
@@ -12103,11 +12179,7 @@
           <a:p>
             <a:r>
               <a:rPr lang="en-AU" dirty="0" smtClean="0"/>
-              <a:t>What is a </a:t>
-            </a:r>
-            <a:r>
-              <a:rPr lang="en-AU" dirty="0" smtClean="0"/>
-              <a:t>Dependency II</a:t>
+              <a:t>What is a Dependency II</a:t>
             </a:r>
             <a:endParaRPr lang="en-AU" dirty="0"/>
           </a:p>
@@ -12157,7 +12229,6 @@
               <a:rPr lang="en-AU" dirty="0" smtClean="0"/>
               <a:t>Various other types of dependencies exist</a:t>
             </a:r>
-            <a:endParaRPr lang="en-AU" dirty="0" smtClean="0"/>
           </a:p>
           <a:p>
             <a:pPr lvl="1"/>
@@ -12186,11 +12257,7 @@
             <a:pPr lvl="2"/>
             <a:r>
               <a:rPr lang="en-AU" dirty="0" smtClean="0"/>
-              <a:t>(</a:t>
-            </a:r>
-            <a:r>
-              <a:rPr lang="en-AU" dirty="0" smtClean="0"/>
-              <a:t>with)</a:t>
+              <a:t>(with)</a:t>
             </a:r>
             <a:r>
               <a:rPr lang="en-AU" i="1" dirty="0" smtClean="0"/>
@@ -12245,15 +12312,7 @@
             <a:pPr lvl="2"/>
             <a:r>
               <a:rPr lang="en-AU" dirty="0" smtClean="0"/>
-              <a:t>help to specify the </a:t>
-            </a:r>
-            <a:r>
-              <a:rPr lang="en-AU" dirty="0" smtClean="0"/>
-              <a:t>referent </a:t>
-            </a:r>
-            <a:r>
-              <a:rPr lang="en-AU" dirty="0" smtClean="0"/>
-              <a:t>(which rat?),</a:t>
+              <a:t>help to specify the referent (which rat?),</a:t>
             </a:r>
             <a:r>
               <a:rPr lang="en-AU" dirty="0"/>
@@ -12268,11 +12327,7 @@
             </a:br>
             <a:r>
               <a:rPr lang="en-AU" dirty="0" smtClean="0"/>
-              <a:t>the head’s relation, etc</a:t>
-            </a:r>
-            <a:r>
-              <a:rPr lang="en-AU" dirty="0" smtClean="0"/>
-              <a:t>.</a:t>
+              <a:t>the head’s relation, etc.</a:t>
             </a:r>
             <a:endParaRPr lang="en-AU" i="1" dirty="0"/>
           </a:p>
@@ -12362,11 +12417,7 @@
             </a:r>
             <a:r>
               <a:rPr lang="en-AU" i="1" dirty="0" smtClean="0"/>
-              <a:t>type, e.g., Stanford </a:t>
-            </a:r>
-            <a:r>
-              <a:rPr lang="en-AU" i="1" dirty="0" smtClean="0"/>
-              <a:t>types, e.g., </a:t>
+              <a:t>type, e.g., Stanford types, e.g., </a:t>
             </a:r>
             <a:r>
               <a:rPr lang="en-AU" dirty="0" smtClean="0"/>
@@ -12828,8 +12879,36 @@
             </a:br>
             <a:r>
               <a:rPr lang="en-AU" dirty="0" smtClean="0"/>
-              <a:t>i.e., noun in a NP, verb in a VP etc.</a:t>
-            </a:r>
+              <a:t>i.e., noun in a NP, verb in a VP etc</a:t>
+            </a:r>
+            <a:r>
+              <a:rPr lang="en-AU" dirty="0"/>
+              <a:t>.</a:t>
+            </a:r>
+            <a:br>
+              <a:rPr lang="en-AU" dirty="0"/>
+            </a:br>
+            <a:r>
+              <a:rPr lang="en-AU" i="1" dirty="0" smtClean="0"/>
+              <a:t>see </a:t>
+            </a:r>
+            <a:r>
+              <a:rPr lang="en-AU" i="1" dirty="0">
+                <a:hlinkClick r:id="rId3"/>
+              </a:rPr>
+              <a:t>https://en.wikipedia.org/wiki/Head_(linguistics</a:t>
+            </a:r>
+            <a:r>
+              <a:rPr lang="en-AU" i="1" dirty="0" smtClean="0">
+                <a:hlinkClick r:id="rId3"/>
+              </a:rPr>
+              <a:t>)</a:t>
+            </a:r>
+            <a:r>
+              <a:rPr lang="en-AU" i="1" dirty="0" smtClean="0"/>
+              <a:t> </a:t>
+            </a:r>
+            <a:endParaRPr lang="en-AU" i="1" dirty="0" smtClean="0"/>
           </a:p>
           <a:p>
             <a:pPr lvl="1"/>
@@ -12894,14 +12973,14 @@
           <p:nvPr/>
         </p:nvPicPr>
         <p:blipFill>
-          <a:blip r:embed="rId3"/>
+          <a:blip r:embed="rId4"/>
           <a:stretch>
             <a:fillRect/>
           </a:stretch>
         </p:blipFill>
         <p:spPr>
           <a:xfrm>
-            <a:off x="5566296" y="4876800"/>
+            <a:off x="5566296" y="5059870"/>
             <a:ext cx="6480720" cy="4387988"/>
           </a:xfrm>
           <a:prstGeom prst="rect">

</xml_diff>